<commit_message>
Update diagrams to include history components
</commit_message>
<xml_diff>
--- a/docs/diagrams/LogicComponentClassDiagram.pptx
+++ b/docs/diagrams/LogicComponentClassDiagram.pptx
@@ -109,7 +109,7 @@
   </p:defaultTextStyle>
   <p:extLst>
     <p:ext uri="{EFAFB233-063F-42B5-8137-9DF3F51BA10A}">
-      <p15:sldGuideLst xmlns:p15="http://schemas.microsoft.com/office/powerpoint/2012/main">
+      <p15:sldGuideLst xmlns:p15="http://schemas.microsoft.com/office/powerpoint/2012/main" xmlns="">
         <p15:guide id="1" orient="horz" pos="1488">
           <p15:clr>
             <a:srgbClr val="A4A3A4"/>
@@ -208,7 +208,7 @@
           <a:p>
             <a:fld id="{F5CC4B3F-88C1-4FFA-B1B6-F41C21DC6924}" type="datetimeFigureOut">
               <a:rPr lang="en-US" smtClean="0"/>
-              <a:t>2/2/2017</a:t>
+              <a:t>17-03-29</a:t>
             </a:fld>
             <a:endParaRPr lang="en-US"/>
           </a:p>
@@ -657,7 +657,7 @@
           <a:p>
             <a:fld id="{78C97017-6FC3-485B-9764-EAC9E56C1D49}" type="datetimeFigureOut">
               <a:rPr lang="en-US" smtClean="0"/>
-              <a:t>2/2/2017</a:t>
+              <a:t>17-03-29</a:t>
             </a:fld>
             <a:endParaRPr lang="en-US"/>
           </a:p>
@@ -827,7 +827,7 @@
           <a:p>
             <a:fld id="{78C97017-6FC3-485B-9764-EAC9E56C1D49}" type="datetimeFigureOut">
               <a:rPr lang="en-US" smtClean="0"/>
-              <a:t>2/2/2017</a:t>
+              <a:t>17-03-29</a:t>
             </a:fld>
             <a:endParaRPr lang="en-US"/>
           </a:p>
@@ -1007,7 +1007,7 @@
           <a:p>
             <a:fld id="{78C97017-6FC3-485B-9764-EAC9E56C1D49}" type="datetimeFigureOut">
               <a:rPr lang="en-US" smtClean="0"/>
-              <a:t>2/2/2017</a:t>
+              <a:t>17-03-29</a:t>
             </a:fld>
             <a:endParaRPr lang="en-US"/>
           </a:p>
@@ -1177,7 +1177,7 @@
           <a:p>
             <a:fld id="{78C97017-6FC3-485B-9764-EAC9E56C1D49}" type="datetimeFigureOut">
               <a:rPr lang="en-US" smtClean="0"/>
-              <a:t>2/2/2017</a:t>
+              <a:t>17-03-29</a:t>
             </a:fld>
             <a:endParaRPr lang="en-US"/>
           </a:p>
@@ -1423,7 +1423,7 @@
           <a:p>
             <a:fld id="{78C97017-6FC3-485B-9764-EAC9E56C1D49}" type="datetimeFigureOut">
               <a:rPr lang="en-US" smtClean="0"/>
-              <a:t>2/2/2017</a:t>
+              <a:t>17-03-29</a:t>
             </a:fld>
             <a:endParaRPr lang="en-US"/>
           </a:p>
@@ -1711,7 +1711,7 @@
           <a:p>
             <a:fld id="{78C97017-6FC3-485B-9764-EAC9E56C1D49}" type="datetimeFigureOut">
               <a:rPr lang="en-US" smtClean="0"/>
-              <a:t>2/2/2017</a:t>
+              <a:t>17-03-29</a:t>
             </a:fld>
             <a:endParaRPr lang="en-US"/>
           </a:p>
@@ -2133,7 +2133,7 @@
           <a:p>
             <a:fld id="{78C97017-6FC3-485B-9764-EAC9E56C1D49}" type="datetimeFigureOut">
               <a:rPr lang="en-US" smtClean="0"/>
-              <a:t>2/2/2017</a:t>
+              <a:t>17-03-29</a:t>
             </a:fld>
             <a:endParaRPr lang="en-US"/>
           </a:p>
@@ -2251,7 +2251,7 @@
           <a:p>
             <a:fld id="{78C97017-6FC3-485B-9764-EAC9E56C1D49}" type="datetimeFigureOut">
               <a:rPr lang="en-US" smtClean="0"/>
-              <a:t>2/2/2017</a:t>
+              <a:t>17-03-29</a:t>
             </a:fld>
             <a:endParaRPr lang="en-US"/>
           </a:p>
@@ -2346,7 +2346,7 @@
           <a:p>
             <a:fld id="{78C97017-6FC3-485B-9764-EAC9E56C1D49}" type="datetimeFigureOut">
               <a:rPr lang="en-US" smtClean="0"/>
-              <a:t>2/2/2017</a:t>
+              <a:t>17-03-29</a:t>
             </a:fld>
             <a:endParaRPr lang="en-US"/>
           </a:p>
@@ -2623,7 +2623,7 @@
           <a:p>
             <a:fld id="{78C97017-6FC3-485B-9764-EAC9E56C1D49}" type="datetimeFigureOut">
               <a:rPr lang="en-US" smtClean="0"/>
-              <a:t>2/2/2017</a:t>
+              <a:t>17-03-29</a:t>
             </a:fld>
             <a:endParaRPr lang="en-US"/>
           </a:p>
@@ -2876,7 +2876,7 @@
           <a:p>
             <a:fld id="{78C97017-6FC3-485B-9764-EAC9E56C1D49}" type="datetimeFigureOut">
               <a:rPr lang="en-US" smtClean="0"/>
-              <a:t>2/2/2017</a:t>
+              <a:t>17-03-29</a:t>
             </a:fld>
             <a:endParaRPr lang="en-US"/>
           </a:p>
@@ -3089,7 +3089,7 @@
           <a:p>
             <a:fld id="{78C97017-6FC3-485B-9764-EAC9E56C1D49}" type="datetimeFigureOut">
               <a:rPr lang="en-US" smtClean="0"/>
-              <a:t>2/2/2017</a:t>
+              <a:t>17-03-29</a:t>
             </a:fld>
             <a:endParaRPr lang="en-US"/>
           </a:p>
@@ -3472,8 +3472,8 @@
         </p:nvSpPr>
         <p:spPr>
           <a:xfrm>
-            <a:off x="1066800" y="914400"/>
-            <a:ext cx="7467600" cy="3733800"/>
+            <a:off x="228600" y="914400"/>
+            <a:ext cx="8686800" cy="3733800"/>
           </a:xfrm>
           <a:prstGeom prst="roundRect">
             <a:avLst>
@@ -3533,7 +3533,7 @@
         </p:nvSpPr>
         <p:spPr>
           <a:xfrm>
-            <a:off x="2095948" y="1253067"/>
+            <a:off x="1431237" y="1253067"/>
             <a:ext cx="1093635" cy="346760"/>
           </a:xfrm>
           <a:prstGeom prst="rect">
@@ -3592,7 +3592,7 @@
         </p:nvSpPr>
         <p:spPr>
           <a:xfrm flipH="1">
-            <a:off x="6520227" y="2149167"/>
+            <a:off x="5855516" y="2149167"/>
             <a:ext cx="1093635" cy="346760"/>
           </a:xfrm>
           <a:prstGeom prst="rect">
@@ -3648,7 +3648,7 @@
         </p:nvSpPr>
         <p:spPr>
           <a:xfrm>
-            <a:off x="1780785" y="3772963"/>
+            <a:off x="1116074" y="3772963"/>
             <a:ext cx="1093635" cy="346760"/>
           </a:xfrm>
           <a:prstGeom prst="rect">
@@ -3710,12 +3710,12 @@
         </p:nvCxnSpPr>
         <p:spPr>
           <a:xfrm flipH="1" flipV="1">
-            <a:off x="3189583" y="1426447"/>
+            <a:off x="2524872" y="1426447"/>
             <a:ext cx="5020699" cy="2895973"/>
           </a:xfrm>
           <a:prstGeom prst="bentConnector3">
             <a:avLst>
-              <a:gd name="adj1" fmla="val -2713"/>
+              <a:gd name="adj1" fmla="val -23961"/>
             </a:avLst>
           </a:prstGeom>
           <a:ln w="19050">
@@ -3753,7 +3753,7 @@
         </p:nvCxnSpPr>
         <p:spPr>
           <a:xfrm>
-            <a:off x="1676400" y="1423587"/>
+            <a:off x="1011689" y="1423587"/>
             <a:ext cx="419548" cy="2860"/>
           </a:xfrm>
           <a:prstGeom prst="bentConnector3">
@@ -3794,7 +3794,7 @@
         </p:nvSpPr>
         <p:spPr>
           <a:xfrm>
-            <a:off x="1103085" y="4777355"/>
+            <a:off x="438374" y="4777355"/>
             <a:ext cx="7431315" cy="328045"/>
           </a:xfrm>
           <a:prstGeom prst="roundRect">
@@ -3854,7 +3854,7 @@
         </p:nvSpPr>
         <p:spPr>
           <a:xfrm flipH="1">
-            <a:off x="6526365" y="2554920"/>
+            <a:off x="5861654" y="2554920"/>
             <a:ext cx="1093635" cy="346760"/>
           </a:xfrm>
           <a:prstGeom prst="rect">
@@ -3910,7 +3910,7 @@
         </p:nvSpPr>
         <p:spPr>
           <a:xfrm flipH="1">
-            <a:off x="6526365" y="3396383"/>
+            <a:off x="5861654" y="3396383"/>
             <a:ext cx="1093635" cy="346760"/>
           </a:xfrm>
           <a:prstGeom prst="rect">
@@ -3981,7 +3981,7 @@
         </p:nvSpPr>
         <p:spPr>
           <a:xfrm>
-            <a:off x="7438239" y="4149040"/>
+            <a:off x="6773528" y="4149040"/>
             <a:ext cx="772043" cy="346760"/>
           </a:xfrm>
           <a:prstGeom prst="rect">
@@ -4052,7 +4052,7 @@
         </p:nvSpPr>
         <p:spPr>
           <a:xfrm>
-            <a:off x="3529350" y="3775502"/>
+            <a:off x="2864639" y="3775502"/>
             <a:ext cx="585450" cy="346760"/>
           </a:xfrm>
           <a:prstGeom prst="rect">
@@ -4110,7 +4110,7 @@
         </p:nvCxnSpPr>
         <p:spPr>
           <a:xfrm>
-            <a:off x="2874420" y="3946343"/>
+            <a:off x="2209709" y="3946343"/>
             <a:ext cx="654930" cy="2539"/>
           </a:xfrm>
           <a:prstGeom prst="bentConnector3">
@@ -4153,7 +4153,7 @@
         </p:nvCxnSpPr>
         <p:spPr>
           <a:xfrm>
-            <a:off x="7824261" y="4495800"/>
+            <a:off x="7159550" y="4495800"/>
             <a:ext cx="0" cy="281555"/>
           </a:xfrm>
           <a:prstGeom prst="straightConnector1">
@@ -4192,7 +4192,7 @@
         </p:nvSpPr>
         <p:spPr>
           <a:xfrm rot="16200000">
-            <a:off x="398120" y="2150720"/>
+            <a:off x="-266591" y="2150720"/>
             <a:ext cx="2209800" cy="346760"/>
           </a:xfrm>
           <a:prstGeom prst="rect">
@@ -4262,7 +4262,7 @@
         </p:nvSpPr>
         <p:spPr>
           <a:xfrm>
-            <a:off x="1359039" y="3429000"/>
+            <a:off x="694328" y="3429000"/>
             <a:ext cx="270504" cy="175523"/>
           </a:xfrm>
           <a:prstGeom prst="triangle">
@@ -4319,7 +4319,7 @@
         </p:nvCxnSpPr>
         <p:spPr>
           <a:xfrm rot="10800000">
-            <a:off x="1494291" y="3604523"/>
+            <a:off x="829580" y="3604523"/>
             <a:ext cx="286494" cy="341820"/>
           </a:xfrm>
           <a:prstGeom prst="bentConnector2">
@@ -4358,7 +4358,7 @@
         </p:nvCxnSpPr>
         <p:spPr>
           <a:xfrm flipH="1">
-            <a:off x="1981201" y="4122262"/>
+            <a:off x="1316490" y="4122262"/>
             <a:ext cx="1" cy="655093"/>
           </a:xfrm>
           <a:prstGeom prst="straightConnector1">
@@ -4396,7 +4396,7 @@
         </p:nvCxnSpPr>
         <p:spPr>
           <a:xfrm>
-            <a:off x="893311" y="2832505"/>
+            <a:off x="228600" y="2832505"/>
             <a:ext cx="419548" cy="2860"/>
           </a:xfrm>
           <a:prstGeom prst="bentConnector3">
@@ -4442,7 +4442,7 @@
         </p:nvCxnSpPr>
         <p:spPr>
           <a:xfrm rot="16200000" flipH="1">
-            <a:off x="4781573" y="1665753"/>
+            <a:off x="4116862" y="1665753"/>
             <a:ext cx="202697" cy="5110636"/>
           </a:xfrm>
           <a:prstGeom prst="bentConnector2">
@@ -4481,7 +4481,7 @@
         </p:nvGrpSpPr>
         <p:grpSpPr>
           <a:xfrm>
-            <a:off x="4597400" y="4341168"/>
+            <a:off x="3932689" y="4341168"/>
             <a:ext cx="889000" cy="230832"/>
             <a:chOff x="2895600" y="807932"/>
             <a:chExt cx="889000" cy="230832"/>
@@ -4581,7 +4581,7 @@
         </p:nvGrpSpPr>
         <p:grpSpPr>
           <a:xfrm>
-            <a:off x="4665110" y="1219200"/>
+            <a:off x="4000399" y="1219200"/>
             <a:ext cx="868568" cy="230832"/>
             <a:chOff x="2755838" y="789460"/>
             <a:chExt cx="868568" cy="230832"/>
@@ -4680,7 +4680,7 @@
         </p:nvSpPr>
         <p:spPr>
           <a:xfrm>
-            <a:off x="2301175" y="1618473"/>
+            <a:off x="1636464" y="1618473"/>
             <a:ext cx="131116" cy="230832"/>
           </a:xfrm>
           <a:prstGeom prst="rect">
@@ -4719,7 +4719,7 @@
         </p:nvSpPr>
         <p:spPr>
           <a:xfrm>
-            <a:off x="2912207" y="3709457"/>
+            <a:off x="2247496" y="3709457"/>
             <a:ext cx="131116" cy="230832"/>
           </a:xfrm>
           <a:prstGeom prst="rect">
@@ -4758,7 +4758,7 @@
         </p:nvSpPr>
         <p:spPr>
           <a:xfrm flipH="1">
-            <a:off x="6526365" y="2956137"/>
+            <a:off x="5861654" y="2956137"/>
             <a:ext cx="1093635" cy="346760"/>
           </a:xfrm>
           <a:prstGeom prst="rect">
@@ -4814,7 +4814,7 @@
         </p:nvCxnSpPr>
         <p:spPr>
           <a:xfrm rot="16200000" flipV="1">
-            <a:off x="1105538" y="2692369"/>
+            <a:off x="440827" y="2692369"/>
             <a:ext cx="2147794" cy="2"/>
           </a:xfrm>
           <a:prstGeom prst="bentConnector3">
@@ -4855,7 +4855,7 @@
         </p:nvSpPr>
         <p:spPr>
           <a:xfrm flipH="1">
-            <a:off x="4664592" y="2148937"/>
+            <a:off x="3999881" y="2148937"/>
             <a:ext cx="1093635" cy="346760"/>
           </a:xfrm>
           <a:prstGeom prst="rect">
@@ -4926,7 +4926,7 @@
         </p:nvSpPr>
         <p:spPr>
           <a:xfrm flipH="1">
-            <a:off x="4664592" y="2555337"/>
+            <a:off x="3999881" y="2555337"/>
             <a:ext cx="1093635" cy="346760"/>
           </a:xfrm>
           <a:prstGeom prst="rect">
@@ -4997,7 +4997,7 @@
         </p:nvSpPr>
         <p:spPr>
           <a:xfrm flipH="1">
-            <a:off x="4664590" y="2977582"/>
+            <a:off x="3999879" y="2977582"/>
             <a:ext cx="1093635" cy="346760"/>
           </a:xfrm>
           <a:prstGeom prst="rect">
@@ -5052,7 +5052,7 @@
         </p:nvSpPr>
         <p:spPr>
           <a:xfrm>
-            <a:off x="2807288" y="1905000"/>
+            <a:off x="2142577" y="1905000"/>
             <a:ext cx="751107" cy="346760"/>
           </a:xfrm>
           <a:prstGeom prst="rect">
@@ -5132,7 +5132,7 @@
         </p:nvSpPr>
         <p:spPr>
           <a:xfrm>
-            <a:off x="2813291" y="2432664"/>
+            <a:off x="2148580" y="2432664"/>
             <a:ext cx="726243" cy="174580"/>
           </a:xfrm>
           <a:prstGeom prst="rect">
@@ -5197,10 +5197,10 @@
         </p:nvGrpSpPr>
         <p:grpSpPr>
           <a:xfrm rot="5400000">
-            <a:off x="5941795" y="1962201"/>
-            <a:ext cx="254462" cy="555486"/>
-            <a:chOff x="3949242" y="712012"/>
-            <a:chExt cx="254462" cy="503902"/>
+            <a:off x="5299525" y="1939760"/>
+            <a:ext cx="254462" cy="600370"/>
+            <a:chOff x="3949241" y="671297"/>
+            <a:chExt cx="254462" cy="544618"/>
           </a:xfrm>
         </p:grpSpPr>
         <p:sp>
@@ -5211,7 +5211,7 @@
           </p:nvSpPr>
           <p:spPr>
             <a:xfrm rot="16200000">
-              <a:off x="3824522" y="836732"/>
+              <a:off x="3824521" y="836733"/>
               <a:ext cx="503902" cy="254462"/>
             </a:xfrm>
             <a:prstGeom prst="rect">
@@ -5253,7 +5253,7 @@
           </p:nvSpPr>
           <p:spPr>
             <a:xfrm rot="10800000" flipV="1">
-              <a:off x="3979474" y="751200"/>
+              <a:off x="3970127" y="671297"/>
               <a:ext cx="132157" cy="79956"/>
             </a:xfrm>
             <a:prstGeom prst="triangle">
@@ -5302,10 +5302,10 @@
         </p:nvGrpSpPr>
         <p:grpSpPr>
           <a:xfrm rot="5400000">
-            <a:off x="5962853" y="2347569"/>
-            <a:ext cx="254462" cy="555486"/>
-            <a:chOff x="3949242" y="712012"/>
-            <a:chExt cx="254462" cy="503902"/>
+            <a:off x="5310054" y="2335656"/>
+            <a:ext cx="254462" cy="579312"/>
+            <a:chOff x="3949242" y="690399"/>
+            <a:chExt cx="254462" cy="525515"/>
           </a:xfrm>
         </p:grpSpPr>
         <p:sp>
@@ -5358,7 +5358,7 @@
           </p:nvSpPr>
           <p:spPr>
             <a:xfrm rot="10800000" flipV="1">
-              <a:off x="3979474" y="751200"/>
+              <a:off x="3965761" y="690399"/>
               <a:ext cx="132157" cy="79956"/>
             </a:xfrm>
             <a:prstGeom prst="triangle">
@@ -5407,7 +5407,7 @@
         </p:nvSpPr>
         <p:spPr>
           <a:xfrm>
-            <a:off x="2819400" y="2841725"/>
+            <a:off x="2154689" y="2841725"/>
             <a:ext cx="731636" cy="283820"/>
           </a:xfrm>
           <a:prstGeom prst="rect">
@@ -5472,7 +5472,7 @@
         </p:nvSpPr>
         <p:spPr>
           <a:xfrm>
-            <a:off x="2819400" y="3190882"/>
+            <a:off x="2154689" y="3190882"/>
             <a:ext cx="731636" cy="283820"/>
           </a:xfrm>
           <a:prstGeom prst="rect">
@@ -5539,7 +5539,7 @@
         </p:nvCxnSpPr>
         <p:spPr>
           <a:xfrm flipH="1">
-            <a:off x="3551036" y="2983635"/>
+            <a:off x="2886325" y="2983635"/>
             <a:ext cx="335164" cy="0"/>
           </a:xfrm>
           <a:prstGeom prst="straightConnector1">
@@ -5580,7 +5580,7 @@
         </p:nvCxnSpPr>
         <p:spPr>
           <a:xfrm flipH="1" flipV="1">
-            <a:off x="3558396" y="3297471"/>
+            <a:off x="2893685" y="3297471"/>
             <a:ext cx="327804" cy="5426"/>
           </a:xfrm>
           <a:prstGeom prst="straightConnector1">
@@ -5623,7 +5623,7 @@
         </p:nvCxnSpPr>
         <p:spPr>
           <a:xfrm rot="16200000" flipV="1">
-            <a:off x="3063575" y="2720082"/>
+            <a:off x="2398864" y="2720082"/>
             <a:ext cx="234481" cy="8806"/>
           </a:xfrm>
           <a:prstGeom prst="bentConnector3">
@@ -5667,7 +5667,7 @@
         </p:nvCxnSpPr>
         <p:spPr>
           <a:xfrm>
-            <a:off x="3539534" y="2078487"/>
+            <a:off x="2874823" y="2078487"/>
             <a:ext cx="346666" cy="0"/>
           </a:xfrm>
           <a:prstGeom prst="line">
@@ -5711,7 +5711,7 @@
         </p:nvCxnSpPr>
         <p:spPr>
           <a:xfrm rot="5400000">
-            <a:off x="3089176" y="2338998"/>
+            <a:off x="2424465" y="2338998"/>
             <a:ext cx="180904" cy="6429"/>
           </a:xfrm>
           <a:prstGeom prst="bentConnector3">
@@ -5755,7 +5755,7 @@
         </p:nvGrpSpPr>
         <p:grpSpPr>
           <a:xfrm rot="5400000">
-            <a:off x="4090826" y="3633626"/>
+            <a:off x="3426115" y="3633626"/>
             <a:ext cx="555486" cy="254462"/>
             <a:chOff x="3798139" y="875689"/>
             <a:chExt cx="555486" cy="230832"/>
@@ -5863,7 +5863,7 @@
         </p:nvCxnSpPr>
         <p:spPr>
           <a:xfrm rot="16200000" flipV="1">
-            <a:off x="7296652" y="3452865"/>
+            <a:off x="6631941" y="3452865"/>
             <a:ext cx="850958" cy="204262"/>
           </a:xfrm>
           <a:prstGeom prst="bentConnector2">
@@ -5897,7 +5897,7 @@
         </p:nvSpPr>
         <p:spPr>
           <a:xfrm flipV="1">
-            <a:off x="7689010" y="3980475"/>
+            <a:off x="7024299" y="3980475"/>
             <a:ext cx="270504" cy="175523"/>
           </a:xfrm>
           <a:prstGeom prst="triangle">
@@ -5954,7 +5954,7 @@
         </p:nvCxnSpPr>
         <p:spPr>
           <a:xfrm rot="16200000" flipV="1">
-            <a:off x="7516775" y="3672988"/>
+            <a:off x="6852064" y="3672988"/>
             <a:ext cx="410712" cy="204262"/>
           </a:xfrm>
           <a:prstGeom prst="bentConnector2">
@@ -5991,7 +5991,7 @@
         </p:nvCxnSpPr>
         <p:spPr>
           <a:xfrm rot="16200000" flipV="1">
-            <a:off x="7096044" y="3252257"/>
+            <a:off x="6431333" y="3252257"/>
             <a:ext cx="1252175" cy="204262"/>
           </a:xfrm>
           <a:prstGeom prst="bentConnector2">
@@ -6028,7 +6028,7 @@
         </p:nvCxnSpPr>
         <p:spPr>
           <a:xfrm rot="16200000" flipV="1">
-            <a:off x="6890098" y="3046311"/>
+            <a:off x="6225387" y="3046311"/>
             <a:ext cx="1657928" cy="210400"/>
           </a:xfrm>
           <a:prstGeom prst="bentConnector2">
@@ -6065,7 +6065,7 @@
         </p:nvCxnSpPr>
         <p:spPr>
           <a:xfrm flipV="1">
-            <a:off x="4114800" y="3150962"/>
+            <a:off x="3450089" y="3150962"/>
             <a:ext cx="549790" cy="797920"/>
           </a:xfrm>
           <a:prstGeom prst="bentConnector3">
@@ -6111,7 +6111,7 @@
         </p:nvCxnSpPr>
         <p:spPr>
           <a:xfrm flipV="1">
-            <a:off x="4114800" y="2728717"/>
+            <a:off x="3450089" y="2728717"/>
             <a:ext cx="549792" cy="1220165"/>
           </a:xfrm>
           <a:prstGeom prst="bentConnector3">
@@ -6157,7 +6157,7 @@
         </p:nvCxnSpPr>
         <p:spPr>
           <a:xfrm flipV="1">
-            <a:off x="4114800" y="2322317"/>
+            <a:off x="3450089" y="2322317"/>
             <a:ext cx="549792" cy="1626565"/>
           </a:xfrm>
           <a:prstGeom prst="bentConnector3">
@@ -6203,7 +6203,7 @@
         </p:nvCxnSpPr>
         <p:spPr>
           <a:xfrm flipV="1">
-            <a:off x="5758227" y="2728300"/>
+            <a:off x="5093516" y="2728300"/>
             <a:ext cx="768138" cy="417"/>
           </a:xfrm>
           <a:prstGeom prst="bentConnector3">
@@ -6249,7 +6249,7 @@
         </p:nvCxnSpPr>
         <p:spPr>
           <a:xfrm>
-            <a:off x="5758227" y="2322317"/>
+            <a:off x="5093516" y="2322317"/>
             <a:ext cx="762000" cy="230"/>
           </a:xfrm>
           <a:prstGeom prst="bentConnector3">
@@ -6292,7 +6292,7 @@
         </p:nvCxnSpPr>
         <p:spPr>
           <a:xfrm>
-            <a:off x="3886200" y="2078487"/>
+            <a:off x="3221489" y="2078487"/>
             <a:ext cx="0" cy="1218984"/>
           </a:xfrm>
           <a:prstGeom prst="line">
@@ -6333,7 +6333,7 @@
         </p:nvCxnSpPr>
         <p:spPr>
           <a:xfrm>
-            <a:off x="3894672" y="2209800"/>
+            <a:off x="3229961" y="2209800"/>
             <a:ext cx="769918" cy="0"/>
           </a:xfrm>
           <a:prstGeom prst="line">
@@ -6374,7 +6374,7 @@
         </p:nvCxnSpPr>
         <p:spPr>
           <a:xfrm>
-            <a:off x="3886200" y="2607244"/>
+            <a:off x="3221489" y="2607244"/>
             <a:ext cx="769918" cy="0"/>
           </a:xfrm>
           <a:prstGeom prst="line">
@@ -6415,7 +6415,7 @@
         </p:nvCxnSpPr>
         <p:spPr>
           <a:xfrm>
-            <a:off x="3886200" y="3048000"/>
+            <a:off x="3221489" y="3048000"/>
             <a:ext cx="769918" cy="0"/>
           </a:xfrm>
           <a:prstGeom prst="line">
@@ -6448,6 +6448,551 @@
           </a:fontRef>
         </p:style>
       </p:cxnSp>
+      <p:sp>
+        <p:nvSpPr>
+          <p:cNvPr id="71" name="Rectangle 11"/>
+          <p:cNvSpPr/>
+          <p:nvPr/>
+        </p:nvSpPr>
+        <p:spPr>
+          <a:xfrm flipH="1">
+            <a:off x="6858000" y="1676400"/>
+            <a:ext cx="1093635" cy="346760"/>
+          </a:xfrm>
+          <a:prstGeom prst="rect">
+            <a:avLst/>
+          </a:prstGeom>
+          <a:solidFill>
+            <a:schemeClr val="tx2">
+              <a:lumMod val="75000"/>
+            </a:schemeClr>
+          </a:solidFill>
+          <a:ln>
+            <a:noFill/>
+          </a:ln>
+          <a:effectLst/>
+        </p:spPr>
+        <p:style>
+          <a:lnRef idx="1">
+            <a:schemeClr val="accent5"/>
+          </a:lnRef>
+          <a:fillRef idx="2">
+            <a:schemeClr val="accent5"/>
+          </a:fillRef>
+          <a:effectRef idx="1">
+            <a:schemeClr val="accent5"/>
+          </a:effectRef>
+          <a:fontRef idx="minor">
+            <a:schemeClr val="dk1"/>
+          </a:fontRef>
+        </p:style>
+        <p:txBody>
+          <a:bodyPr rtlCol="0" anchor="ctr"/>
+          <a:lstStyle/>
+          <a:p>
+            <a:pPr algn="ctr"/>
+            <a:r>
+              <a:rPr lang="en-US" sz="1050" b="1" dirty="0" err="1" smtClean="0">
+                <a:solidFill>
+                  <a:schemeClr val="bg1"/>
+                </a:solidFill>
+              </a:rPr>
+              <a:t>TaskMemento</a:t>
+            </a:r>
+            <a:endParaRPr lang="en-US" sz="1050" b="1" dirty="0">
+              <a:solidFill>
+                <a:schemeClr val="bg1"/>
+              </a:solidFill>
+            </a:endParaRPr>
+          </a:p>
+        </p:txBody>
+      </p:sp>
+      <p:cxnSp>
+        <p:nvCxnSpPr>
+          <p:cNvPr id="72" name="Elbow Connector 63"/>
+          <p:cNvCxnSpPr>
+            <a:stCxn id="11" idx="1"/>
+            <a:endCxn id="71" idx="2"/>
+          </p:cNvCxnSpPr>
+          <p:nvPr/>
+        </p:nvCxnSpPr>
+        <p:spPr>
+          <a:xfrm flipV="1">
+            <a:off x="6955289" y="2023160"/>
+            <a:ext cx="449528" cy="1546603"/>
+          </a:xfrm>
+          <a:prstGeom prst="bentConnector2">
+            <a:avLst/>
+          </a:prstGeom>
+          <a:ln w="19050">
+            <a:solidFill>
+              <a:schemeClr val="tx2">
+                <a:lumMod val="75000"/>
+              </a:schemeClr>
+            </a:solidFill>
+            <a:prstDash val="sysDot"/>
+            <a:headEnd type="none" w="med" len="med"/>
+            <a:tailEnd type="arrow" w="med" len="med"/>
+          </a:ln>
+          <a:effectLst/>
+        </p:spPr>
+        <p:style>
+          <a:lnRef idx="1">
+            <a:schemeClr val="accent2"/>
+          </a:lnRef>
+          <a:fillRef idx="2">
+            <a:schemeClr val="accent2"/>
+          </a:fillRef>
+          <a:effectRef idx="1">
+            <a:schemeClr val="accent2"/>
+          </a:effectRef>
+          <a:fontRef idx="minor">
+            <a:schemeClr val="dk1"/>
+          </a:fontRef>
+        </p:style>
+      </p:cxnSp>
+      <p:sp>
+        <p:nvSpPr>
+          <p:cNvPr id="83" name="TextBox 82"/>
+          <p:cNvSpPr txBox="1"/>
+          <p:nvPr/>
+        </p:nvSpPr>
+        <p:spPr>
+          <a:xfrm rot="16200000">
+            <a:off x="7342257" y="2411343"/>
+            <a:ext cx="479286" cy="228600"/>
+          </a:xfrm>
+          <a:prstGeom prst="rect">
+            <a:avLst/>
+          </a:prstGeom>
+          <a:noFill/>
+        </p:spPr>
+        <p:txBody>
+          <a:bodyPr wrap="square" lIns="0" tIns="0" rIns="0" bIns="0" rtlCol="0">
+            <a:noAutofit/>
+          </a:bodyPr>
+          <a:lstStyle/>
+          <a:p>
+            <a:r>
+              <a:rPr lang="en-US" sz="1100" dirty="0" smtClean="0">
+                <a:solidFill>
+                  <a:schemeClr val="tx2">
+                    <a:lumMod val="75000"/>
+                  </a:schemeClr>
+                </a:solidFill>
+              </a:rPr>
+              <a:t>creates</a:t>
+            </a:r>
+            <a:endParaRPr lang="en-SG" sz="1100" dirty="0">
+              <a:solidFill>
+                <a:schemeClr val="tx2">
+                  <a:lumMod val="75000"/>
+                </a:schemeClr>
+              </a:solidFill>
+            </a:endParaRPr>
+          </a:p>
+        </p:txBody>
+      </p:sp>
+      <p:sp>
+        <p:nvSpPr>
+          <p:cNvPr id="85" name="Isosceles Triangle 84"/>
+          <p:cNvSpPr/>
+          <p:nvPr/>
+        </p:nvSpPr>
+        <p:spPr>
+          <a:xfrm rot="10800000" flipV="1">
+            <a:off x="7467600" y="2209800"/>
+            <a:ext cx="132157" cy="88141"/>
+          </a:xfrm>
+          <a:prstGeom prst="triangle">
+            <a:avLst/>
+          </a:prstGeom>
+          <a:solidFill>
+            <a:schemeClr val="tx2">
+              <a:lumMod val="75000"/>
+            </a:schemeClr>
+          </a:solidFill>
+          <a:ln>
+            <a:noFill/>
+          </a:ln>
+        </p:spPr>
+        <p:style>
+          <a:lnRef idx="2">
+            <a:schemeClr val="accent1">
+              <a:shade val="50000"/>
+            </a:schemeClr>
+          </a:lnRef>
+          <a:fillRef idx="1">
+            <a:schemeClr val="accent1"/>
+          </a:fillRef>
+          <a:effectRef idx="0">
+            <a:schemeClr val="accent1"/>
+          </a:effectRef>
+          <a:fontRef idx="minor">
+            <a:schemeClr val="lt1"/>
+          </a:fontRef>
+        </p:style>
+        <p:txBody>
+          <a:bodyPr rtlCol="0" anchor="ctr"/>
+          <a:lstStyle/>
+          <a:p>
+            <a:pPr algn="ctr"/>
+            <a:endParaRPr lang="en-SG"/>
+          </a:p>
+        </p:txBody>
+      </p:sp>
+      <p:cxnSp>
+        <p:nvCxnSpPr>
+          <p:cNvPr id="51" name="Straight Connector 50"/>
+          <p:cNvCxnSpPr/>
+          <p:nvPr/>
+        </p:nvCxnSpPr>
+        <p:spPr>
+          <a:xfrm flipV="1">
+            <a:off x="6955289" y="3048000"/>
+            <a:ext cx="431999" cy="5317"/>
+          </a:xfrm>
+          <a:prstGeom prst="line">
+            <a:avLst/>
+          </a:prstGeom>
+          <a:ln w="19050">
+            <a:solidFill>
+              <a:schemeClr val="tx2">
+                <a:lumMod val="75000"/>
+              </a:schemeClr>
+            </a:solidFill>
+            <a:prstDash val="sysDot"/>
+          </a:ln>
+          <a:effectLst/>
+        </p:spPr>
+        <p:style>
+          <a:lnRef idx="2">
+            <a:schemeClr val="accent1"/>
+          </a:lnRef>
+          <a:fillRef idx="0">
+            <a:schemeClr val="accent1"/>
+          </a:fillRef>
+          <a:effectRef idx="1">
+            <a:schemeClr val="accent1"/>
+          </a:effectRef>
+          <a:fontRef idx="minor">
+            <a:schemeClr val="tx1"/>
+          </a:fontRef>
+        </p:style>
+      </p:cxnSp>
+      <p:cxnSp>
+        <p:nvCxnSpPr>
+          <p:cNvPr id="127" name="Straight Connector 126"/>
+          <p:cNvCxnSpPr/>
+          <p:nvPr/>
+        </p:nvCxnSpPr>
+        <p:spPr>
+          <a:xfrm flipV="1">
+            <a:off x="6955289" y="2667000"/>
+            <a:ext cx="431999" cy="5317"/>
+          </a:xfrm>
+          <a:prstGeom prst="line">
+            <a:avLst/>
+          </a:prstGeom>
+          <a:ln w="19050">
+            <a:solidFill>
+              <a:schemeClr val="tx2">
+                <a:lumMod val="75000"/>
+              </a:schemeClr>
+            </a:solidFill>
+            <a:prstDash val="sysDot"/>
+          </a:ln>
+          <a:effectLst/>
+        </p:spPr>
+        <p:style>
+          <a:lnRef idx="2">
+            <a:schemeClr val="accent1"/>
+          </a:lnRef>
+          <a:fillRef idx="0">
+            <a:schemeClr val="accent1"/>
+          </a:fillRef>
+          <a:effectRef idx="1">
+            <a:schemeClr val="accent1"/>
+          </a:effectRef>
+          <a:fontRef idx="minor">
+            <a:schemeClr val="tx1"/>
+          </a:fontRef>
+        </p:style>
+      </p:cxnSp>
+      <p:cxnSp>
+        <p:nvCxnSpPr>
+          <p:cNvPr id="128" name="Straight Connector 127"/>
+          <p:cNvCxnSpPr/>
+          <p:nvPr/>
+        </p:nvCxnSpPr>
+        <p:spPr>
+          <a:xfrm flipV="1">
+            <a:off x="6955289" y="2286000"/>
+            <a:ext cx="431999" cy="5317"/>
+          </a:xfrm>
+          <a:prstGeom prst="line">
+            <a:avLst/>
+          </a:prstGeom>
+          <a:ln w="19050">
+            <a:solidFill>
+              <a:schemeClr val="tx2">
+                <a:lumMod val="75000"/>
+              </a:schemeClr>
+            </a:solidFill>
+            <a:prstDash val="sysDot"/>
+          </a:ln>
+          <a:effectLst/>
+        </p:spPr>
+        <p:style>
+          <a:lnRef idx="2">
+            <a:schemeClr val="accent1"/>
+          </a:lnRef>
+          <a:fillRef idx="0">
+            <a:schemeClr val="accent1"/>
+          </a:fillRef>
+          <a:effectRef idx="1">
+            <a:schemeClr val="accent1"/>
+          </a:effectRef>
+          <a:fontRef idx="minor">
+            <a:schemeClr val="tx1"/>
+          </a:fontRef>
+        </p:style>
+      </p:cxnSp>
+      <p:sp>
+        <p:nvSpPr>
+          <p:cNvPr id="132" name="Rectangle 11"/>
+          <p:cNvSpPr/>
+          <p:nvPr/>
+        </p:nvSpPr>
+        <p:spPr>
+          <a:xfrm flipH="1">
+            <a:off x="7620000" y="2971800"/>
+            <a:ext cx="1066800" cy="346760"/>
+          </a:xfrm>
+          <a:prstGeom prst="rect">
+            <a:avLst/>
+          </a:prstGeom>
+          <a:solidFill>
+            <a:schemeClr val="tx2">
+              <a:lumMod val="75000"/>
+            </a:schemeClr>
+          </a:solidFill>
+          <a:ln>
+            <a:noFill/>
+          </a:ln>
+          <a:effectLst/>
+        </p:spPr>
+        <p:style>
+          <a:lnRef idx="1">
+            <a:schemeClr val="accent5"/>
+          </a:lnRef>
+          <a:fillRef idx="2">
+            <a:schemeClr val="accent5"/>
+          </a:fillRef>
+          <a:effectRef idx="1">
+            <a:schemeClr val="accent5"/>
+          </a:effectRef>
+          <a:fontRef idx="minor">
+            <a:schemeClr val="dk1"/>
+          </a:fontRef>
+        </p:style>
+        <p:txBody>
+          <a:bodyPr rtlCol="0" anchor="ctr"/>
+          <a:lstStyle/>
+          <a:p>
+            <a:pPr algn="ctr"/>
+            <a:r>
+              <a:rPr lang="en-US" sz="1050" b="1" dirty="0" err="1" smtClean="0">
+                <a:solidFill>
+                  <a:schemeClr val="bg1"/>
+                </a:solidFill>
+              </a:rPr>
+              <a:t>TaskMementos</a:t>
+            </a:r>
+            <a:endParaRPr lang="en-US" sz="1050" b="1" dirty="0">
+              <a:solidFill>
+                <a:schemeClr val="bg1"/>
+              </a:solidFill>
+            </a:endParaRPr>
+          </a:p>
+        </p:txBody>
+      </p:sp>
+      <p:cxnSp>
+        <p:nvCxnSpPr>
+          <p:cNvPr id="134" name="Elbow Connector 63"/>
+          <p:cNvCxnSpPr>
+            <a:stCxn id="71" idx="1"/>
+            <a:endCxn id="132" idx="0"/>
+          </p:cNvCxnSpPr>
+          <p:nvPr/>
+        </p:nvCxnSpPr>
+        <p:spPr>
+          <a:xfrm>
+            <a:off x="7951635" y="1849780"/>
+            <a:ext cx="201765" cy="1122020"/>
+          </a:xfrm>
+          <a:prstGeom prst="bentConnector2">
+            <a:avLst/>
+          </a:prstGeom>
+          <a:ln w="19050">
+            <a:solidFill>
+              <a:schemeClr val="tx2">
+                <a:lumMod val="75000"/>
+              </a:schemeClr>
+            </a:solidFill>
+            <a:prstDash val="sysDot"/>
+            <a:headEnd type="none" w="med" len="med"/>
+            <a:tailEnd type="arrow" w="med" len="med"/>
+          </a:ln>
+          <a:effectLst/>
+        </p:spPr>
+        <p:style>
+          <a:lnRef idx="1">
+            <a:schemeClr val="accent2"/>
+          </a:lnRef>
+          <a:fillRef idx="2">
+            <a:schemeClr val="accent2"/>
+          </a:fillRef>
+          <a:effectRef idx="1">
+            <a:schemeClr val="accent2"/>
+          </a:effectRef>
+          <a:fontRef idx="minor">
+            <a:schemeClr val="dk1"/>
+          </a:fontRef>
+        </p:style>
+      </p:cxnSp>
+      <p:sp>
+        <p:nvSpPr>
+          <p:cNvPr id="137" name="TextBox 136"/>
+          <p:cNvSpPr txBox="1"/>
+          <p:nvPr/>
+        </p:nvSpPr>
+        <p:spPr>
+          <a:xfrm rot="5400000">
+            <a:off x="7913757" y="2198757"/>
+            <a:ext cx="707886" cy="228600"/>
+          </a:xfrm>
+          <a:prstGeom prst="rect">
+            <a:avLst/>
+          </a:prstGeom>
+          <a:noFill/>
+        </p:spPr>
+        <p:txBody>
+          <a:bodyPr wrap="square" lIns="0" tIns="0" rIns="0" bIns="0" rtlCol="0">
+            <a:noAutofit/>
+          </a:bodyPr>
+          <a:lstStyle/>
+          <a:p>
+            <a:r>
+              <a:rPr lang="en-US" sz="1100" dirty="0" smtClean="0">
+                <a:solidFill>
+                  <a:schemeClr val="tx2">
+                    <a:lumMod val="75000"/>
+                  </a:schemeClr>
+                </a:solidFill>
+              </a:rPr>
+              <a:t>Added to</a:t>
+            </a:r>
+            <a:endParaRPr lang="en-SG" sz="1100" dirty="0">
+              <a:solidFill>
+                <a:schemeClr val="tx2">
+                  <a:lumMod val="75000"/>
+                </a:schemeClr>
+              </a:solidFill>
+            </a:endParaRPr>
+          </a:p>
+        </p:txBody>
+      </p:sp>
+      <p:sp>
+        <p:nvSpPr>
+          <p:cNvPr id="138" name="Isosceles Triangle 137"/>
+          <p:cNvSpPr/>
+          <p:nvPr/>
+        </p:nvSpPr>
+        <p:spPr>
+          <a:xfrm flipV="1">
+            <a:off x="8229600" y="2590800"/>
+            <a:ext cx="132157" cy="88141"/>
+          </a:xfrm>
+          <a:prstGeom prst="triangle">
+            <a:avLst/>
+          </a:prstGeom>
+          <a:solidFill>
+            <a:schemeClr val="tx2">
+              <a:lumMod val="75000"/>
+            </a:schemeClr>
+          </a:solidFill>
+          <a:ln>
+            <a:noFill/>
+          </a:ln>
+        </p:spPr>
+        <p:style>
+          <a:lnRef idx="2">
+            <a:schemeClr val="accent1">
+              <a:shade val="50000"/>
+            </a:schemeClr>
+          </a:lnRef>
+          <a:fillRef idx="1">
+            <a:schemeClr val="accent1"/>
+          </a:fillRef>
+          <a:effectRef idx="0">
+            <a:schemeClr val="accent1"/>
+          </a:effectRef>
+          <a:fontRef idx="minor">
+            <a:schemeClr val="lt1"/>
+          </a:fontRef>
+        </p:style>
+        <p:txBody>
+          <a:bodyPr rtlCol="0" anchor="ctr"/>
+          <a:lstStyle/>
+          <a:p>
+            <a:pPr algn="ctr"/>
+            <a:endParaRPr lang="en-SG"/>
+          </a:p>
+        </p:txBody>
+      </p:sp>
+      <p:sp>
+        <p:nvSpPr>
+          <p:cNvPr id="139" name="TextBox 138"/>
+          <p:cNvSpPr txBox="1"/>
+          <p:nvPr/>
+        </p:nvSpPr>
+        <p:spPr>
+          <a:xfrm>
+            <a:off x="7924800" y="2743200"/>
+            <a:ext cx="152400" cy="228600"/>
+          </a:xfrm>
+          <a:prstGeom prst="rect">
+            <a:avLst/>
+          </a:prstGeom>
+          <a:noFill/>
+        </p:spPr>
+        <p:txBody>
+          <a:bodyPr wrap="square" lIns="0" tIns="0" rIns="0" bIns="0" rtlCol="0">
+            <a:noAutofit/>
+          </a:bodyPr>
+          <a:lstStyle/>
+          <a:p>
+            <a:r>
+              <a:rPr lang="en-US" sz="1100" dirty="0" smtClean="0">
+                <a:solidFill>
+                  <a:schemeClr val="tx2">
+                    <a:lumMod val="75000"/>
+                  </a:schemeClr>
+                </a:solidFill>
+              </a:rPr>
+              <a:t>1</a:t>
+            </a:r>
+            <a:endParaRPr lang="en-SG" sz="1100" dirty="0">
+              <a:solidFill>
+                <a:schemeClr val="tx2">
+                  <a:lumMod val="75000"/>
+                </a:schemeClr>
+              </a:solidFill>
+            </a:endParaRPr>
+          </a:p>
+        </p:txBody>
+      </p:sp>
     </p:spTree>
     <p:extLst>
       <p:ext uri="{BB962C8B-B14F-4D97-AF65-F5344CB8AC3E}">

</xml_diff>